<commit_message>
Kesalahan metode evaluasi diperbaiki
</commit_message>
<xml_diff>
--- a/DailyNeeds.co.id/LAPORAN/SIDANG/DOKUMEN/Sidang TA 18211031 Nicolas Novian Ruslim.pptx
+++ b/DailyNeeds.co.id/LAPORAN/SIDANG/DOKUMEN/Sidang TA 18211031 Nicolas Novian Ruslim.pptx
@@ -276,6 +276,11 @@
       </a:defRPr>
     </a:lvl9pPr>
   </p:defaultTextStyle>
+  <p:extLst>
+    <p:ext uri="{EFAFB233-063F-42B5-8137-9DF3F51BA10A}">
+      <p15:sldGuideLst xmlns:p15="http://schemas.microsoft.com/office/powerpoint/2012/main"/>
+    </p:ext>
+  </p:extLst>
 </p:presentation>
 </file>
 
@@ -9631,19 +9636,8 @@
                 <a:latin typeface="Browallia New" panose="020B0604020202020204" pitchFamily="34" charset="-34"/>
                 <a:cs typeface="Browallia New" panose="020B0604020202020204" pitchFamily="34" charset="-34"/>
               </a:rPr>
-              <a:t>, </a:t>
-            </a:r>
-            <a:r>
-              <a:rPr lang="en-US" sz="2400" dirty="0" smtClean="0">
-                <a:latin typeface="Browallia New" panose="020B0604020202020204" pitchFamily="34" charset="-34"/>
-                <a:cs typeface="Browallia New" panose="020B0604020202020204" pitchFamily="34" charset="-34"/>
-              </a:rPr>
-              <a:t>MSEE</a:t>
-            </a:r>
-            <a:endParaRPr lang="en-US" sz="2400" dirty="0" smtClean="0">
-              <a:latin typeface="Browallia New" panose="020B0604020202020204" pitchFamily="34" charset="-34"/>
-              <a:cs typeface="Browallia New" panose="020B0604020202020204" pitchFamily="34" charset="-34"/>
-            </a:endParaRPr>
+              <a:t>, MSEE</a:t>
+            </a:r>
           </a:p>
         </p:txBody>
       </p:sp>
@@ -10800,10 +10794,6 @@
               </a:rPr>
               <a:t>		Compute the similarity between I1 and I2</a:t>
             </a:r>
-            <a:endParaRPr lang="id-ID" sz="2400" dirty="0" smtClean="0">
-              <a:latin typeface="Browallia New" panose="020B0604020202020204" pitchFamily="34" charset="-34"/>
-              <a:cs typeface="Browallia New" panose="020B0604020202020204" pitchFamily="34" charset="-34"/>
-            </a:endParaRPr>
           </a:p>
         </p:txBody>
       </p:sp>
@@ -13720,8 +13710,21 @@
                   <a:schemeClr val="dk1"/>
                 </a:solidFill>
               </a:rPr>
-              <a:t>Mampu memberikan rekomendasi resep makanan yang aman dikonsumsi dan dinilai serupa dengan resep yang disukai atau sedang dilihat oleh pelanggan tersebut.</a:t>
-            </a:r>
+              <a:t>Mampu memberikan rekomendasi resep makanan yang aman dikonsumsi dan dinilai serupa dengan resep yang </a:t>
+            </a:r>
+            <a:r>
+              <a:rPr lang="id" sz="2100" b="0" i="0" u="none" strike="noStrike" cap="none" baseline="0" dirty="0" smtClean="0">
+                <a:solidFill>
+                  <a:schemeClr val="dk1"/>
+                </a:solidFill>
+              </a:rPr>
+              <a:t>disukai oleh pelanggan tersebut.</a:t>
+            </a:r>
+            <a:endParaRPr lang="id" sz="2100" b="0" i="0" u="none" strike="noStrike" cap="none" baseline="0" dirty="0">
+              <a:solidFill>
+                <a:schemeClr val="dk1"/>
+              </a:solidFill>
+            </a:endParaRPr>
           </a:p>
         </p:txBody>
       </p:sp>
@@ -15302,7 +15305,177 @@
   <p:timing>
     <p:tnLst>
       <p:par>
-        <p:cTn id="1" dur="indefinite" restart="never" nodeType="tmRoot"/>
+        <p:cTn id="1" dur="indefinite" restart="never" nodeType="tmRoot">
+          <p:childTnLst>
+            <p:seq concurrent="1" nextAc="seek">
+              <p:cTn id="2" dur="indefinite" nodeType="mainSeq">
+                <p:childTnLst>
+                  <p:par>
+                    <p:cTn id="3" fill="hold">
+                      <p:stCondLst>
+                        <p:cond delay="indefinite"/>
+                      </p:stCondLst>
+                      <p:childTnLst>
+                        <p:par>
+                          <p:cTn id="4" fill="hold">
+                            <p:stCondLst>
+                              <p:cond delay="0"/>
+                            </p:stCondLst>
+                            <p:childTnLst>
+                              <p:par>
+                                <p:cTn id="5" presetID="1" presetClass="entr" presetSubtype="0" fill="hold" nodeType="clickEffect">
+                                  <p:stCondLst>
+                                    <p:cond delay="0"/>
+                                  </p:stCondLst>
+                                  <p:childTnLst>
+                                    <p:set>
+                                      <p:cBhvr>
+                                        <p:cTn id="6" dur="1" fill="hold">
+                                          <p:stCondLst>
+                                            <p:cond delay="0"/>
+                                          </p:stCondLst>
+                                        </p:cTn>
+                                        <p:tgtEl>
+                                          <p:spTgt spid="7">
+                                            <p:txEl>
+                                              <p:pRg st="0" end="0"/>
+                                            </p:txEl>
+                                          </p:spTgt>
+                                        </p:tgtEl>
+                                        <p:attrNameLst>
+                                          <p:attrName>style.visibility</p:attrName>
+                                        </p:attrNameLst>
+                                      </p:cBhvr>
+                                      <p:to>
+                                        <p:strVal val="visible"/>
+                                      </p:to>
+                                    </p:set>
+                                  </p:childTnLst>
+                                </p:cTn>
+                              </p:par>
+                            </p:childTnLst>
+                          </p:cTn>
+                        </p:par>
+                      </p:childTnLst>
+                    </p:cTn>
+                  </p:par>
+                  <p:par>
+                    <p:cTn id="7" fill="hold">
+                      <p:stCondLst>
+                        <p:cond delay="indefinite"/>
+                      </p:stCondLst>
+                      <p:childTnLst>
+                        <p:par>
+                          <p:cTn id="8" fill="hold">
+                            <p:stCondLst>
+                              <p:cond delay="0"/>
+                            </p:stCondLst>
+                            <p:childTnLst>
+                              <p:par>
+                                <p:cTn id="9" presetID="1" presetClass="entr" presetSubtype="0" fill="hold" nodeType="clickEffect">
+                                  <p:stCondLst>
+                                    <p:cond delay="0"/>
+                                  </p:stCondLst>
+                                  <p:childTnLst>
+                                    <p:set>
+                                      <p:cBhvr>
+                                        <p:cTn id="10" dur="1" fill="hold">
+                                          <p:stCondLst>
+                                            <p:cond delay="0"/>
+                                          </p:stCondLst>
+                                        </p:cTn>
+                                        <p:tgtEl>
+                                          <p:spTgt spid="7">
+                                            <p:txEl>
+                                              <p:pRg st="1" end="1"/>
+                                            </p:txEl>
+                                          </p:spTgt>
+                                        </p:tgtEl>
+                                        <p:attrNameLst>
+                                          <p:attrName>style.visibility</p:attrName>
+                                        </p:attrNameLst>
+                                      </p:cBhvr>
+                                      <p:to>
+                                        <p:strVal val="visible"/>
+                                      </p:to>
+                                    </p:set>
+                                  </p:childTnLst>
+                                </p:cTn>
+                              </p:par>
+                            </p:childTnLst>
+                          </p:cTn>
+                        </p:par>
+                      </p:childTnLst>
+                    </p:cTn>
+                  </p:par>
+                  <p:par>
+                    <p:cTn id="11" fill="hold">
+                      <p:stCondLst>
+                        <p:cond delay="indefinite"/>
+                      </p:stCondLst>
+                      <p:childTnLst>
+                        <p:par>
+                          <p:cTn id="12" fill="hold">
+                            <p:stCondLst>
+                              <p:cond delay="0"/>
+                            </p:stCondLst>
+                            <p:childTnLst>
+                              <p:par>
+                                <p:cTn id="13" presetID="1" presetClass="entr" presetSubtype="0" fill="hold" nodeType="clickEffect">
+                                  <p:stCondLst>
+                                    <p:cond delay="0"/>
+                                  </p:stCondLst>
+                                  <p:childTnLst>
+                                    <p:set>
+                                      <p:cBhvr>
+                                        <p:cTn id="14" dur="1" fill="hold">
+                                          <p:stCondLst>
+                                            <p:cond delay="0"/>
+                                          </p:stCondLst>
+                                        </p:cTn>
+                                        <p:tgtEl>
+                                          <p:spTgt spid="7">
+                                            <p:txEl>
+                                              <p:pRg st="2" end="2"/>
+                                            </p:txEl>
+                                          </p:spTgt>
+                                        </p:tgtEl>
+                                        <p:attrNameLst>
+                                          <p:attrName>style.visibility</p:attrName>
+                                        </p:attrNameLst>
+                                      </p:cBhvr>
+                                      <p:to>
+                                        <p:strVal val="visible"/>
+                                      </p:to>
+                                    </p:set>
+                                  </p:childTnLst>
+                                </p:cTn>
+                              </p:par>
+                            </p:childTnLst>
+                          </p:cTn>
+                        </p:par>
+                      </p:childTnLst>
+                    </p:cTn>
+                  </p:par>
+                </p:childTnLst>
+              </p:cTn>
+              <p:prevCondLst>
+                <p:cond evt="onPrev" delay="0">
+                  <p:tgtEl>
+                    <p:sldTgt/>
+                  </p:tgtEl>
+                </p:cond>
+              </p:prevCondLst>
+              <p:nextCondLst>
+                <p:cond evt="onNext" delay="0">
+                  <p:tgtEl>
+                    <p:sldTgt/>
+                  </p:tgtEl>
+                </p:cond>
+              </p:nextCondLst>
+            </p:seq>
+          </p:childTnLst>
+        </p:cTn>
       </p:par>
     </p:tnLst>
   </p:timing>
@@ -15751,13 +15924,20 @@
                 <a:latin typeface="+mj-lt"/>
                 <a:cs typeface="Browallia New" panose="020B0604020202020204" pitchFamily="34" charset="-34"/>
               </a:rPr>
-              <a:t> cosine-based similarity </a:t>
+              <a:t> </a:t>
+            </a:r>
+            <a:r>
+              <a:rPr lang="en-GB" sz="2100" i="1" dirty="0">
+                <a:latin typeface="+mj-lt"/>
+                <a:cs typeface="Browallia New" panose="020B0604020202020204" pitchFamily="34" charset="-34"/>
+              </a:rPr>
+              <a:t>cosine-based similarity </a:t>
             </a:r>
           </a:p>
         </p:txBody>
       </p:sp>
-      <mc:AlternateContent xmlns:mc="http://schemas.openxmlformats.org/markup-compatibility/2006">
-        <mc:Choice xmlns:a14="http://schemas.microsoft.com/office/drawing/2010/main" Requires="a14">
+      <mc:AlternateContent xmlns:mc="http://schemas.openxmlformats.org/markup-compatibility/2006" xmlns:a14="http://schemas.microsoft.com/office/drawing/2010/main">
+        <mc:Choice Requires="a14">
           <p:sp>
             <p:nvSpPr>
               <p:cNvPr id="5" name="Rectangle 4"/>
@@ -16069,7 +16249,7 @@
             </p:txBody>
           </p:sp>
         </mc:Choice>
-        <mc:Fallback>
+        <mc:Fallback xmlns="">
           <p:sp>
             <p:nvSpPr>
               <p:cNvPr id="5" name="Rectangle 4"/>
@@ -17176,8 +17356,8 @@
           </a:p>
         </p:txBody>
       </p:sp>
-      <mc:AlternateContent xmlns:mc="http://schemas.openxmlformats.org/markup-compatibility/2006">
-        <mc:Choice xmlns:a14="http://schemas.microsoft.com/office/drawing/2010/main" Requires="a14">
+      <mc:AlternateContent xmlns:mc="http://schemas.openxmlformats.org/markup-compatibility/2006" xmlns:a14="http://schemas.microsoft.com/office/drawing/2010/main">
+        <mc:Choice Requires="a14">
           <p:sp>
             <p:nvSpPr>
               <p:cNvPr id="5" name="Rectangle 4"/>
@@ -17592,7 +17772,7 @@
             </p:txBody>
           </p:sp>
         </mc:Choice>
-        <mc:Fallback>
+        <mc:Fallback xmlns="">
           <p:sp>
             <p:nvSpPr>
               <p:cNvPr id="5" name="Rectangle 4"/>
@@ -17631,8 +17811,8 @@
           </p:sp>
         </mc:Fallback>
       </mc:AlternateContent>
-      <mc:AlternateContent xmlns:mc="http://schemas.openxmlformats.org/markup-compatibility/2006">
-        <mc:Choice xmlns:a14="http://schemas.microsoft.com/office/drawing/2010/main" Requires="a14">
+      <mc:AlternateContent xmlns:mc="http://schemas.openxmlformats.org/markup-compatibility/2006" xmlns:a14="http://schemas.microsoft.com/office/drawing/2010/main">
+        <mc:Choice Requires="a14">
           <p:sp>
             <p:nvSpPr>
               <p:cNvPr id="8" name="TextBox 7"/>
@@ -17931,7 +18111,7 @@
             </p:txBody>
           </p:sp>
         </mc:Choice>
-        <mc:Fallback>
+        <mc:Fallback xmlns="">
           <p:sp>
             <p:nvSpPr>
               <p:cNvPr id="8" name="TextBox 7"/>
@@ -20981,12 +21161,28 @@
               <a:buSzPct val="25000"/>
             </a:pPr>
             <a:r>
-              <a:rPr lang="en-US" sz="3300" b="0" dirty="0" err="1">
+              <a:rPr lang="en-US" sz="3300" b="0" dirty="0" err="1" smtClean="0">
                 <a:solidFill>
                   <a:srgbClr val="FFFFFF"/>
                 </a:solidFill>
               </a:rPr>
               <a:t>Pengujian</a:t>
+            </a:r>
+            <a:r>
+              <a:rPr lang="en-US" sz="3300" b="0" dirty="0" smtClean="0">
+                <a:solidFill>
+                  <a:srgbClr val="FFFFFF"/>
+                </a:solidFill>
+              </a:rPr>
+              <a:t> </a:t>
+            </a:r>
+            <a:r>
+              <a:rPr lang="en-US" sz="3300" b="0" dirty="0" err="1" smtClean="0">
+                <a:solidFill>
+                  <a:srgbClr val="FFFFFF"/>
+                </a:solidFill>
+              </a:rPr>
+              <a:t>Fungsional</a:t>
             </a:r>
             <a:endParaRPr lang="id" sz="3300" b="0" i="0" u="none" strike="noStrike" cap="none" baseline="0" dirty="0">
               <a:solidFill>
@@ -21005,14 +21201,14 @@
           <p:nvPr>
             <p:extLst>
               <p:ext uri="{D42A27DB-BD31-4B8C-83A1-F6EECF244321}">
-                <p14:modId xmlns:p14="http://schemas.microsoft.com/office/powerpoint/2010/main" val="376686111"/>
+                <p14:modId xmlns:p14="http://schemas.microsoft.com/office/powerpoint/2010/main" val="3809356145"/>
               </p:ext>
             </p:extLst>
           </p:nvPr>
         </p:nvGraphicFramePr>
         <p:xfrm>
           <a:off x="0" y="1331407"/>
-          <a:ext cx="9023251" cy="3619799"/>
+          <a:ext cx="9023251" cy="3647320"/>
         </p:xfrm>
         <a:graphic>
           <a:graphicData uri="http://schemas.openxmlformats.org/drawingml/2006/table">
@@ -22163,55 +22359,19 @@
                         <a:t>disukai</a:t>
                       </a:r>
                       <a:r>
-                        <a:rPr lang="en-GB" sz="1400" dirty="0">
+                        <a:rPr lang="en-GB" sz="1400">
                           <a:effectLst/>
                         </a:rPr>
                         <a:t> </a:t>
                       </a:r>
                       <a:r>
-                        <a:rPr lang="en-GB" sz="1400" dirty="0" err="1">
-                          <a:effectLst/>
-                        </a:rPr>
-                        <a:t>atau</a:t>
-                      </a:r>
-                      <a:r>
-                        <a:rPr lang="en-GB" sz="1400" dirty="0">
-                          <a:effectLst/>
-                        </a:rPr>
-                        <a:t> </a:t>
-                      </a:r>
-                      <a:r>
-                        <a:rPr lang="en-GB" sz="1400" dirty="0" err="1">
-                          <a:effectLst/>
-                        </a:rPr>
-                        <a:t>sedang</a:t>
-                      </a:r>
-                      <a:r>
-                        <a:rPr lang="en-GB" sz="1400" dirty="0">
-                          <a:effectLst/>
-                        </a:rPr>
-                        <a:t> </a:t>
-                      </a:r>
-                      <a:r>
-                        <a:rPr lang="en-GB" sz="1400" dirty="0" err="1">
-                          <a:effectLst/>
-                        </a:rPr>
-                        <a:t>dilihat</a:t>
-                      </a:r>
-                      <a:r>
-                        <a:rPr lang="en-GB" sz="1400" dirty="0">
-                          <a:effectLst/>
-                        </a:rPr>
-                        <a:t> </a:t>
-                      </a:r>
-                      <a:r>
-                        <a:rPr lang="en-GB" sz="1400" dirty="0" err="1">
+                        <a:rPr lang="en-GB" sz="1400" smtClean="0">
                           <a:effectLst/>
                         </a:rPr>
                         <a:t>oleh</a:t>
                       </a:r>
                       <a:r>
-                        <a:rPr lang="en-GB" sz="1400" dirty="0">
+                        <a:rPr lang="en-GB" sz="1400" dirty="0" smtClean="0">
                           <a:effectLst/>
                         </a:rPr>
                         <a:t> </a:t>
@@ -22499,8 +22659,8 @@
           </a:p>
         </p:txBody>
       </p:sp>
-      <mc:AlternateContent xmlns:mc="http://schemas.openxmlformats.org/markup-compatibility/2006">
-        <mc:Choice xmlns:a14="http://schemas.microsoft.com/office/drawing/2010/main" Requires="a14">
+      <mc:AlternateContent xmlns:mc="http://schemas.openxmlformats.org/markup-compatibility/2006" xmlns:a14="http://schemas.microsoft.com/office/drawing/2010/main">
+        <mc:Choice Requires="a14">
           <p:sp>
             <p:nvSpPr>
               <p:cNvPr id="7" name="Content Placeholder 5"/>
@@ -22813,15 +22973,7 @@
                     <a:ea typeface="Times New Roman" panose="02020603050405020304" pitchFamily="18" charset="0"/>
                     <a:cs typeface="Browallia New" panose="020B0604020202020204" pitchFamily="34" charset="-34"/>
                   </a:rPr>
-                  <a:t>(MAE</a:t>
-                </a:r>
-                <a:r>
-                  <a:rPr lang="en-GB" sz="2400" dirty="0">
-                    <a:latin typeface="+mj-lt"/>
-                    <a:ea typeface="Times New Roman" panose="02020603050405020304" pitchFamily="18" charset="0"/>
-                    <a:cs typeface="Browallia New" panose="020B0604020202020204" pitchFamily="34" charset="-34"/>
-                  </a:rPr>
-                  <a:t>)</a:t>
+                  <a:t>(MAE)</a:t>
                 </a:r>
               </a:p>
               <a:p>
@@ -22836,6 +22988,7 @@
                 </a:endParaRPr>
               </a:p>
               <a:p>
+                <a:pPr/>
                 <a14:m>
                   <m:oMathPara xmlns:m="http://schemas.openxmlformats.org/officeDocument/2006/math">
                     <m:oMathParaPr>
@@ -22844,13 +22997,13 @@
                     <m:oMath xmlns:m="http://schemas.openxmlformats.org/officeDocument/2006/math">
                       <m:r>
                         <a:rPr lang="en-GB" sz="2400" i="1">
-                          <a:latin typeface="+mj-lt"/>
+                          <a:latin typeface="Cambria Math" panose="02040503050406030204" pitchFamily="18" charset="0"/>
                         </a:rPr>
                         <m:t>𝑀𝐴𝐸</m:t>
                       </m:r>
                       <m:r>
                         <a:rPr lang="en-GB" sz="2400" i="1">
-                          <a:latin typeface="+mj-lt"/>
+                          <a:latin typeface="Cambria Math" panose="02040503050406030204" pitchFamily="18" charset="0"/>
                         </a:rPr>
                         <m:t>= </m:t>
                       </m:r>
@@ -22858,14 +23011,14 @@
                         <m:fPr>
                           <m:ctrlPr>
                             <a:rPr lang="en-US" sz="2400" i="1">
-                              <a:latin typeface="+mj-lt"/>
+                              <a:latin typeface="Cambria Math" panose="02040503050406030204" pitchFamily="18" charset="0"/>
                             </a:rPr>
                           </m:ctrlPr>
                         </m:fPr>
                         <m:num>
                           <m:r>
                             <a:rPr lang="en-GB" sz="2400" i="1">
-                              <a:latin typeface="+mj-lt"/>
+                              <a:latin typeface="Cambria Math" panose="02040503050406030204" pitchFamily="18" charset="0"/>
                             </a:rPr>
                             <m:t>1</m:t>
                           </m:r>
@@ -22873,7 +23026,7 @@
                         <m:den>
                           <m:r>
                             <a:rPr lang="en-GB" sz="2400" i="1">
-                              <a:latin typeface="+mj-lt"/>
+                              <a:latin typeface="Cambria Math" panose="02040503050406030204" pitchFamily="18" charset="0"/>
                             </a:rPr>
                             <m:t>𝑛</m:t>
                           </m:r>
@@ -22885,20 +23038,20 @@
                           <m:limLoc m:val="undOvr"/>
                           <m:ctrlPr>
                             <a:rPr lang="en-US" sz="2400" i="1">
-                              <a:latin typeface="+mj-lt"/>
+                              <a:latin typeface="Cambria Math" panose="02040503050406030204" pitchFamily="18" charset="0"/>
                             </a:rPr>
                           </m:ctrlPr>
                         </m:naryPr>
                         <m:sub>
                           <m:r>
                             <a:rPr lang="en-GB" sz="2400" i="1">
-                              <a:latin typeface="+mj-lt"/>
+                              <a:latin typeface="Cambria Math" panose="02040503050406030204" pitchFamily="18" charset="0"/>
                             </a:rPr>
                             <m:t>𝑖</m:t>
                           </m:r>
                           <m:r>
                             <a:rPr lang="en-GB" sz="2400" i="1">
-                              <a:latin typeface="+mj-lt"/>
+                              <a:latin typeface="Cambria Math" panose="02040503050406030204" pitchFamily="18" charset="0"/>
                             </a:rPr>
                             <m:t>=1</m:t>
                           </m:r>
@@ -22906,7 +23059,7 @@
                         <m:sup>
                           <m:r>
                             <a:rPr lang="en-GB" sz="2400" i="1">
-                              <a:latin typeface="+mj-lt"/>
+                              <a:latin typeface="Cambria Math" panose="02040503050406030204" pitchFamily="18" charset="0"/>
                             </a:rPr>
                             <m:t>𝑛</m:t>
                           </m:r>
@@ -22914,7 +23067,7 @@
                         <m:e>
                           <m:r>
                             <a:rPr lang="en-GB" sz="2400" i="1">
-                              <a:latin typeface="+mj-lt"/>
+                              <a:latin typeface="Cambria Math" panose="02040503050406030204" pitchFamily="18" charset="0"/>
                             </a:rPr>
                             <m:t>|</m:t>
                           </m:r>
@@ -22922,14 +23075,14 @@
                             <m:sSubPr>
                               <m:ctrlPr>
                                 <a:rPr lang="en-US" sz="2400" i="1">
-                                  <a:latin typeface="+mj-lt"/>
+                                  <a:latin typeface="Cambria Math" panose="02040503050406030204" pitchFamily="18" charset="0"/>
                                 </a:rPr>
                               </m:ctrlPr>
                             </m:sSubPr>
                             <m:e>
                               <m:r>
                                 <a:rPr lang="en-GB" sz="2400" i="1">
-                                  <a:latin typeface="+mj-lt"/>
+                                  <a:latin typeface="Cambria Math" panose="02040503050406030204" pitchFamily="18" charset="0"/>
                                 </a:rPr>
                                 <m:t>𝑓</m:t>
                               </m:r>
@@ -22937,7 +23090,7 @@
                             <m:sub>
                               <m:r>
                                 <a:rPr lang="en-GB" sz="2400" i="1">
-                                  <a:latin typeface="+mj-lt"/>
+                                  <a:latin typeface="Cambria Math" panose="02040503050406030204" pitchFamily="18" charset="0"/>
                                 </a:rPr>
                                 <m:t>𝑖</m:t>
                               </m:r>
@@ -22945,7 +23098,7 @@
                           </m:sSub>
                           <m:r>
                             <a:rPr lang="en-GB" sz="2400" i="1">
-                              <a:latin typeface="+mj-lt"/>
+                              <a:latin typeface="Cambria Math" panose="02040503050406030204" pitchFamily="18" charset="0"/>
                             </a:rPr>
                             <m:t>−</m:t>
                           </m:r>
@@ -22953,14 +23106,14 @@
                             <m:sSubPr>
                               <m:ctrlPr>
                                 <a:rPr lang="en-US" sz="2400" i="1">
-                                  <a:latin typeface="+mj-lt"/>
+                                  <a:latin typeface="Cambria Math" panose="02040503050406030204" pitchFamily="18" charset="0"/>
                                 </a:rPr>
                               </m:ctrlPr>
                             </m:sSubPr>
                             <m:e>
                               <m:r>
                                 <a:rPr lang="en-GB" sz="2400" i="1">
-                                  <a:latin typeface="+mj-lt"/>
+                                  <a:latin typeface="Cambria Math" panose="02040503050406030204" pitchFamily="18" charset="0"/>
                                 </a:rPr>
                                 <m:t>𝑦</m:t>
                               </m:r>
@@ -22968,7 +23121,7 @@
                             <m:sub>
                               <m:r>
                                 <a:rPr lang="en-GB" sz="2400" i="1">
-                                  <a:latin typeface="+mj-lt"/>
+                                  <a:latin typeface="Cambria Math" panose="02040503050406030204" pitchFamily="18" charset="0"/>
                                 </a:rPr>
                                 <m:t>𝑖</m:t>
                               </m:r>
@@ -22976,7 +23129,7 @@
                           </m:sSub>
                           <m:r>
                             <a:rPr lang="en-GB" sz="2400" i="1">
-                              <a:latin typeface="+mj-lt"/>
+                              <a:latin typeface="Cambria Math" panose="02040503050406030204" pitchFamily="18" charset="0"/>
                             </a:rPr>
                             <m:t>|</m:t>
                           </m:r>
@@ -22984,7 +23137,7 @@
                       </m:nary>
                       <m:r>
                         <a:rPr lang="en-GB" sz="2400" i="1">
-                          <a:latin typeface="+mj-lt"/>
+                          <a:latin typeface="Cambria Math" panose="02040503050406030204" pitchFamily="18" charset="0"/>
                         </a:rPr>
                         <m:t>= </m:t>
                       </m:r>
@@ -22992,14 +23145,14 @@
                         <m:fPr>
                           <m:ctrlPr>
                             <a:rPr lang="en-US" sz="2400" i="1">
-                              <a:latin typeface="+mj-lt"/>
+                              <a:latin typeface="Cambria Math" panose="02040503050406030204" pitchFamily="18" charset="0"/>
                             </a:rPr>
                           </m:ctrlPr>
                         </m:fPr>
                         <m:num>
                           <m:r>
                             <a:rPr lang="en-GB" sz="2400" i="1">
-                              <a:latin typeface="+mj-lt"/>
+                              <a:latin typeface="Cambria Math" panose="02040503050406030204" pitchFamily="18" charset="0"/>
                             </a:rPr>
                             <m:t>1</m:t>
                           </m:r>
@@ -23007,7 +23160,7 @@
                         <m:den>
                           <m:r>
                             <a:rPr lang="en-GB" sz="2400" i="1">
-                              <a:latin typeface="+mj-lt"/>
+                              <a:latin typeface="Cambria Math" panose="02040503050406030204" pitchFamily="18" charset="0"/>
                             </a:rPr>
                             <m:t>𝑛</m:t>
                           </m:r>
@@ -23019,20 +23172,20 @@
                           <m:limLoc m:val="undOvr"/>
                           <m:ctrlPr>
                             <a:rPr lang="en-US" sz="2400" i="1">
-                              <a:latin typeface="+mj-lt"/>
+                              <a:latin typeface="Cambria Math" panose="02040503050406030204" pitchFamily="18" charset="0"/>
                             </a:rPr>
                           </m:ctrlPr>
                         </m:naryPr>
                         <m:sub>
                           <m:r>
                             <a:rPr lang="en-GB" sz="2400" i="1">
-                              <a:latin typeface="+mj-lt"/>
+                              <a:latin typeface="Cambria Math" panose="02040503050406030204" pitchFamily="18" charset="0"/>
                             </a:rPr>
                             <m:t>𝑖</m:t>
                           </m:r>
                           <m:r>
                             <a:rPr lang="en-GB" sz="2400" i="1">
-                              <a:latin typeface="+mj-lt"/>
+                              <a:latin typeface="Cambria Math" panose="02040503050406030204" pitchFamily="18" charset="0"/>
                             </a:rPr>
                             <m:t>=1</m:t>
                           </m:r>
@@ -23040,7 +23193,7 @@
                         <m:sup>
                           <m:r>
                             <a:rPr lang="en-GB" sz="2400" i="1">
-                              <a:latin typeface="+mj-lt"/>
+                              <a:latin typeface="Cambria Math" panose="02040503050406030204" pitchFamily="18" charset="0"/>
                             </a:rPr>
                             <m:t>𝑛</m:t>
                           </m:r>
@@ -23048,7 +23201,7 @@
                         <m:e>
                           <m:r>
                             <a:rPr lang="en-GB" sz="2400" i="1">
-                              <a:latin typeface="+mj-lt"/>
+                              <a:latin typeface="Cambria Math" panose="02040503050406030204" pitchFamily="18" charset="0"/>
                             </a:rPr>
                             <m:t>|</m:t>
                           </m:r>
@@ -23056,14 +23209,14 @@
                             <m:sSubPr>
                               <m:ctrlPr>
                                 <a:rPr lang="en-US" sz="2400" i="1">
-                                  <a:latin typeface="+mj-lt"/>
+                                  <a:latin typeface="Cambria Math" panose="02040503050406030204" pitchFamily="18" charset="0"/>
                                 </a:rPr>
                               </m:ctrlPr>
                             </m:sSubPr>
                             <m:e>
                               <m:r>
                                 <a:rPr lang="en-GB" sz="2400" i="1">
-                                  <a:latin typeface="+mj-lt"/>
+                                  <a:latin typeface="Cambria Math" panose="02040503050406030204" pitchFamily="18" charset="0"/>
                                 </a:rPr>
                                 <m:t>𝑒</m:t>
                               </m:r>
@@ -23071,7 +23224,7 @@
                             <m:sub>
                               <m:r>
                                 <a:rPr lang="en-GB" sz="2400" i="1">
-                                  <a:latin typeface="+mj-lt"/>
+                                  <a:latin typeface="Cambria Math" panose="02040503050406030204" pitchFamily="18" charset="0"/>
                                 </a:rPr>
                                 <m:t>𝑖</m:t>
                               </m:r>
@@ -23079,7 +23232,7 @@
                           </m:sSub>
                           <m:r>
                             <a:rPr lang="en-GB" sz="2400" i="1">
-                              <a:latin typeface="+mj-lt"/>
+                              <a:latin typeface="Cambria Math" panose="02040503050406030204" pitchFamily="18" charset="0"/>
                             </a:rPr>
                             <m:t>|</m:t>
                           </m:r>
@@ -23087,7 +23240,7 @@
                       </m:nary>
                       <m:r>
                         <a:rPr lang="en-GB" sz="2400" i="1">
-                          <a:latin typeface="+mj-lt"/>
+                          <a:latin typeface="Cambria Math" panose="02040503050406030204" pitchFamily="18" charset="0"/>
                         </a:rPr>
                         <m:t> </m:t>
                       </m:r>
@@ -23103,7 +23256,7 @@
             </p:txBody>
           </p:sp>
         </mc:Choice>
-        <mc:Fallback>
+        <mc:Fallback xmlns="">
           <p:sp>
             <p:nvSpPr>
               <p:cNvPr id="7" name="Content Placeholder 5"/>
@@ -23145,8 +23298,8 @@
           </p:sp>
         </mc:Fallback>
       </mc:AlternateContent>
-      <mc:AlternateContent xmlns:mc="http://schemas.openxmlformats.org/markup-compatibility/2006">
-        <mc:Choice xmlns:a14="http://schemas.microsoft.com/office/drawing/2010/main" Requires="a14">
+      <mc:AlternateContent xmlns:mc="http://schemas.openxmlformats.org/markup-compatibility/2006" xmlns:a14="http://schemas.microsoft.com/office/drawing/2010/main">
+        <mc:Choice Requires="a14">
           <p:sp>
             <p:nvSpPr>
               <p:cNvPr id="4" name="TextBox 3"/>
@@ -23446,7 +23599,7 @@
             </p:txBody>
           </p:sp>
         </mc:Choice>
-        <mc:Fallback>
+        <mc:Fallback xmlns="">
           <p:sp>
             <p:nvSpPr>
               <p:cNvPr id="4" name="TextBox 3"/>

</xml_diff>